<commit_message>
Update Trees Get Degrees_Full_Presentation.pptx
</commit_message>
<xml_diff>
--- a/Presentations/Trees Get Degrees_Full_Presentation.pptx
+++ b/Presentations/Trees Get Degrees_Full_Presentation.pptx
@@ -3460,8 +3460,8 @@
         </p:nvSpPr>
         <p:spPr>
           <a:xfrm>
-            <a:off x="1524000" y="1122363"/>
-            <a:ext cx="9144000" cy="3063240"/>
+            <a:off x="1524000" y="2489377"/>
+            <a:ext cx="9144000" cy="1696226"/>
           </a:xfrm>
         </p:spPr>
         <p:txBody>
@@ -3471,12 +3471,12 @@
           <a:lstStyle/>
           <a:p>
             <a:r>
-              <a:rPr lang="en-US" sz="5100" b="1">
+              <a:rPr lang="en-US" sz="5100" b="1" dirty="0">
                 <a:solidFill>
                   <a:srgbClr val="FFFFFF"/>
                 </a:solidFill>
               </a:rPr>
-              <a:t>Trees Get Degrees: Using Decision Trees to Determine Important Features for College Acceptance</a:t>
+              <a:t>Trees Get Degrees:  Decision Trees of Features for College Enrollment</a:t>
             </a:r>
           </a:p>
         </p:txBody>
@@ -20020,6 +20020,36 @@
           </a:prstGeom>
         </p:spPr>
       </p:pic>
+      <p:pic>
+        <p:nvPicPr>
+          <p:cNvPr id="54" name="Picture 53">
+            <a:extLst>
+              <a:ext uri="{FF2B5EF4-FFF2-40B4-BE49-F238E27FC236}">
+                <a16:creationId xmlns:a16="http://schemas.microsoft.com/office/drawing/2014/main" id="{85F66D98-555C-4764-8969-6E107A1B4BEF}"/>
+              </a:ext>
+            </a:extLst>
+          </p:cNvPr>
+          <p:cNvPicPr>
+            <a:picLocks noChangeAspect="1"/>
+          </p:cNvPicPr>
+          <p:nvPr/>
+        </p:nvPicPr>
+        <p:blipFill>
+          <a:blip r:embed="rId9"/>
+          <a:stretch>
+            <a:fillRect/>
+          </a:stretch>
+        </p:blipFill>
+        <p:spPr>
+          <a:xfrm>
+            <a:off x="10738277" y="-198804"/>
+            <a:ext cx="2871465" cy="1127858"/>
+          </a:xfrm>
+          <a:prstGeom prst="rect">
+            <a:avLst/>
+          </a:prstGeom>
+        </p:spPr>
+      </p:pic>
     </p:spTree>
     <p:extLst>
       <p:ext uri="{BB962C8B-B14F-4D97-AF65-F5344CB8AC3E}">

</xml_diff>

<commit_message>
fixed slide for ppt
</commit_message>
<xml_diff>
--- a/Presentations/Trees Get Degrees_Full_Presentation.pptx
+++ b/Presentations/Trees Get Degrees_Full_Presentation.pptx
@@ -14218,6 +14218,36 @@
           </a:p>
         </p:txBody>
       </p:sp>
+      <p:pic>
+        <p:nvPicPr>
+          <p:cNvPr id="7206" name="Picture 7205">
+            <a:extLst>
+              <a:ext uri="{FF2B5EF4-FFF2-40B4-BE49-F238E27FC236}">
+                <a16:creationId xmlns:a16="http://schemas.microsoft.com/office/drawing/2014/main" id="{4C4645DE-0467-4E42-846B-A325CFBDE535}"/>
+              </a:ext>
+            </a:extLst>
+          </p:cNvPr>
+          <p:cNvPicPr>
+            <a:picLocks noChangeAspect="1"/>
+          </p:cNvPicPr>
+          <p:nvPr/>
+        </p:nvPicPr>
+        <p:blipFill>
+          <a:blip r:embed="rId3"/>
+          <a:stretch>
+            <a:fillRect/>
+          </a:stretch>
+        </p:blipFill>
+        <p:spPr>
+          <a:xfrm>
+            <a:off x="304378" y="3410111"/>
+            <a:ext cx="4879986" cy="2233327"/>
+          </a:xfrm>
+          <a:prstGeom prst="rect">
+            <a:avLst/>
+          </a:prstGeom>
+        </p:spPr>
+      </p:pic>
       <p:sp>
         <p:nvSpPr>
           <p:cNvPr id="2" name="Title 1">
@@ -14429,7 +14459,7 @@
           <p:nvPr/>
         </p:nvPicPr>
         <p:blipFill>
-          <a:blip r:embed="rId3">
+          <a:blip r:embed="rId4">
             <a:duotone>
               <a:schemeClr val="accent3">
                 <a:shade val="45000"/>
@@ -14483,36 +14513,6 @@
           <p:nvPr/>
         </p:nvPicPr>
         <p:blipFill>
-          <a:blip r:embed="rId4"/>
-          <a:stretch>
-            <a:fillRect/>
-          </a:stretch>
-        </p:blipFill>
-        <p:spPr>
-          <a:xfrm>
-            <a:off x="1100895" y="2469546"/>
-            <a:ext cx="3049183" cy="686820"/>
-          </a:xfrm>
-          <a:prstGeom prst="rect">
-            <a:avLst/>
-          </a:prstGeom>
-        </p:spPr>
-      </p:pic>
-      <p:pic>
-        <p:nvPicPr>
-          <p:cNvPr id="14" name="Picture 13">
-            <a:extLst>
-              <a:ext uri="{FF2B5EF4-FFF2-40B4-BE49-F238E27FC236}">
-                <a16:creationId xmlns:a16="http://schemas.microsoft.com/office/drawing/2014/main" id="{1BAB73F5-43BF-4CD2-831A-3094D357EDB9}"/>
-              </a:ext>
-            </a:extLst>
-          </p:cNvPr>
-          <p:cNvPicPr>
-            <a:picLocks noChangeAspect="1"/>
-          </p:cNvPicPr>
-          <p:nvPr/>
-        </p:nvPicPr>
-        <p:blipFill>
           <a:blip r:embed="rId5"/>
           <a:stretch>
             <a:fillRect/>
@@ -14520,8 +14520,38 @@
         </p:blipFill>
         <p:spPr>
           <a:xfrm>
-            <a:off x="320862" y="6546712"/>
-            <a:ext cx="1757874" cy="260019"/>
+            <a:off x="1100895" y="2469546"/>
+            <a:ext cx="3049183" cy="686820"/>
+          </a:xfrm>
+          <a:prstGeom prst="rect">
+            <a:avLst/>
+          </a:prstGeom>
+        </p:spPr>
+      </p:pic>
+      <p:pic>
+        <p:nvPicPr>
+          <p:cNvPr id="14" name="Picture 13">
+            <a:extLst>
+              <a:ext uri="{FF2B5EF4-FFF2-40B4-BE49-F238E27FC236}">
+                <a16:creationId xmlns:a16="http://schemas.microsoft.com/office/drawing/2014/main" id="{1BAB73F5-43BF-4CD2-831A-3094D357EDB9}"/>
+              </a:ext>
+            </a:extLst>
+          </p:cNvPr>
+          <p:cNvPicPr>
+            <a:picLocks noChangeAspect="1"/>
+          </p:cNvPicPr>
+          <p:nvPr/>
+        </p:nvPicPr>
+        <p:blipFill>
+          <a:blip r:embed="rId6"/>
+          <a:stretch>
+            <a:fillRect/>
+          </a:stretch>
+        </p:blipFill>
+        <p:spPr>
+          <a:xfrm>
+            <a:off x="1202220" y="6019772"/>
+            <a:ext cx="2671048" cy="395093"/>
           </a:xfrm>
           <a:prstGeom prst="rect">
             <a:avLst/>
@@ -14622,7 +14652,7 @@
         </p:nvSpPr>
         <p:spPr>
           <a:xfrm>
-            <a:off x="5012502" y="3837930"/>
+            <a:off x="5005356" y="3797865"/>
             <a:ext cx="2109776" cy="369332"/>
           </a:xfrm>
           <a:prstGeom prst="rect">
@@ -14664,7 +14694,7 @@
         </p:nvSpPr>
         <p:spPr>
           <a:xfrm>
-            <a:off x="5012502" y="4311009"/>
+            <a:off x="5005356" y="4243194"/>
             <a:ext cx="2242297" cy="369332"/>
           </a:xfrm>
           <a:prstGeom prst="rect">
@@ -14706,7 +14736,7 @@
         </p:nvSpPr>
         <p:spPr>
           <a:xfrm>
-            <a:off x="5012503" y="4776727"/>
+            <a:off x="5384903" y="4701904"/>
             <a:ext cx="2573602" cy="369332"/>
           </a:xfrm>
           <a:prstGeom prst="rect">
@@ -14746,7 +14776,7 @@
         </p:nvSpPr>
         <p:spPr>
           <a:xfrm>
-            <a:off x="5012502" y="5404378"/>
+            <a:off x="5384903" y="5145449"/>
             <a:ext cx="2679619" cy="369332"/>
           </a:xfrm>
           <a:prstGeom prst="rect">
@@ -14864,36 +14894,6 @@
           </a:fontRef>
         </p:style>
       </p:cxnSp>
-      <p:pic>
-        <p:nvPicPr>
-          <p:cNvPr id="7199" name="Picture 7198">
-            <a:extLst>
-              <a:ext uri="{FF2B5EF4-FFF2-40B4-BE49-F238E27FC236}">
-                <a16:creationId xmlns:a16="http://schemas.microsoft.com/office/drawing/2014/main" id="{4378412B-48CE-4A84-B3A0-7C7C85A8BA56}"/>
-              </a:ext>
-            </a:extLst>
-          </p:cNvPr>
-          <p:cNvPicPr>
-            <a:picLocks noChangeAspect="1"/>
-          </p:cNvPicPr>
-          <p:nvPr/>
-        </p:nvPicPr>
-        <p:blipFill>
-          <a:blip r:embed="rId6"/>
-          <a:stretch>
-            <a:fillRect/>
-          </a:stretch>
-        </p:blipFill>
-        <p:spPr>
-          <a:xfrm>
-            <a:off x="831621" y="3507089"/>
-            <a:ext cx="3680460" cy="2773049"/>
-          </a:xfrm>
-          <a:prstGeom prst="rect">
-            <a:avLst/>
-          </a:prstGeom>
-        </p:spPr>
-      </p:pic>
       <p:cxnSp>
         <p:nvCxnSpPr>
           <p:cNvPr id="48" name="Connector: Elbow 47">
@@ -14911,12 +14911,12 @@
         </p:nvCxnSpPr>
         <p:spPr>
           <a:xfrm rot="10800000">
-            <a:off x="2237172" y="3837930"/>
-            <a:ext cx="2775331" cy="184666"/>
+            <a:off x="1728890" y="3820487"/>
+            <a:ext cx="3276467" cy="162045"/>
           </a:xfrm>
           <a:prstGeom prst="bentConnector3">
             <a:avLst>
-              <a:gd name="adj1" fmla="val 99899"/>
+              <a:gd name="adj1" fmla="val 99951"/>
             </a:avLst>
           </a:prstGeom>
           <a:ln w="19050">
@@ -14961,12 +14961,12 @@
         </p:nvCxnSpPr>
         <p:spPr>
           <a:xfrm rot="10800000">
-            <a:off x="2206014" y="4381343"/>
-            <a:ext cx="2806488" cy="114332"/>
+            <a:off x="1682506" y="4303848"/>
+            <a:ext cx="3322850" cy="124012"/>
           </a:xfrm>
           <a:prstGeom prst="bentConnector3">
             <a:avLst>
-              <a:gd name="adj1" fmla="val 100053"/>
+              <a:gd name="adj1" fmla="val 100051"/>
             </a:avLst>
           </a:prstGeom>
           <a:ln w="19050">
@@ -15010,9 +15010,9 @@
           <p:nvPr/>
         </p:nvCxnSpPr>
         <p:spPr>
-          <a:xfrm flipH="1">
-            <a:off x="2206015" y="4961393"/>
-            <a:ext cx="2806488" cy="0"/>
+          <a:xfrm flipH="1" flipV="1">
+            <a:off x="5005356" y="4708361"/>
+            <a:ext cx="379547" cy="178209"/>
           </a:xfrm>
           <a:prstGeom prst="straightConnector1">
             <a:avLst/>
@@ -15055,9 +15055,9 @@
           <p:nvPr/>
         </p:nvCxnSpPr>
         <p:spPr>
-          <a:xfrm flipH="1">
-            <a:off x="2206013" y="5589044"/>
-            <a:ext cx="2806489" cy="15664"/>
+          <a:xfrm flipH="1" flipV="1">
+            <a:off x="4812764" y="5077693"/>
+            <a:ext cx="572139" cy="252422"/>
           </a:xfrm>
           <a:prstGeom prst="straightConnector1">
             <a:avLst/>
@@ -15098,7 +15098,7 @@
         </p:nvSpPr>
         <p:spPr>
           <a:xfrm>
-            <a:off x="5012501" y="3364852"/>
+            <a:off x="5012501" y="3336754"/>
             <a:ext cx="1168871" cy="369332"/>
           </a:xfrm>
           <a:prstGeom prst="rect">
@@ -15144,7 +15144,7 @@
         </p:nvCxnSpPr>
         <p:spPr>
           <a:xfrm rot="10800000">
-            <a:off x="2892389" y="2901526"/>
+            <a:off x="2892389" y="2873428"/>
             <a:ext cx="2120112" cy="647993"/>
           </a:xfrm>
           <a:prstGeom prst="bentConnector3">
@@ -15199,8 +15199,8 @@
         </p:blipFill>
         <p:spPr>
           <a:xfrm>
-            <a:off x="1153944" y="6237105"/>
-            <a:ext cx="2104137" cy="331963"/>
+            <a:off x="1230734" y="5643438"/>
+            <a:ext cx="2671048" cy="421403"/>
           </a:xfrm>
           <a:prstGeom prst="rect">
             <a:avLst/>
@@ -15229,8 +15229,8 @@
         </p:blipFill>
         <p:spPr>
           <a:xfrm>
-            <a:off x="2206013" y="6496975"/>
-            <a:ext cx="2112975" cy="309756"/>
+            <a:off x="1253899" y="6352587"/>
+            <a:ext cx="2567690" cy="376416"/>
           </a:xfrm>
           <a:prstGeom prst="rect">
             <a:avLst/>

</xml_diff>

<commit_message>
fixed a missing "for all"
</commit_message>
<xml_diff>
--- a/Presentations/Trees Get Degrees_Full_Presentation.pptx
+++ b/Presentations/Trees Get Degrees_Full_Presentation.pptx
@@ -14220,10 +14220,10 @@
       </p:sp>
       <p:pic>
         <p:nvPicPr>
-          <p:cNvPr id="7206" name="Picture 7205">
-            <a:extLst>
-              <a:ext uri="{FF2B5EF4-FFF2-40B4-BE49-F238E27FC236}">
-                <a16:creationId xmlns:a16="http://schemas.microsoft.com/office/drawing/2014/main" id="{4C4645DE-0467-4E42-846B-A325CFBDE535}"/>
+          <p:cNvPr id="7218" name="Picture 7217">
+            <a:extLst>
+              <a:ext uri="{FF2B5EF4-FFF2-40B4-BE49-F238E27FC236}">
+                <a16:creationId xmlns:a16="http://schemas.microsoft.com/office/drawing/2014/main" id="{06578522-2DF1-409F-A3DE-01C94CA48277}"/>
               </a:ext>
             </a:extLst>
           </p:cNvPr>
@@ -14240,8 +14240,8 @@
         </p:blipFill>
         <p:spPr>
           <a:xfrm>
-            <a:off x="304378" y="3410111"/>
-            <a:ext cx="4879986" cy="2233327"/>
+            <a:off x="253245" y="3393144"/>
+            <a:ext cx="4980374" cy="2272598"/>
           </a:xfrm>
           <a:prstGeom prst="rect">
             <a:avLst/>
@@ -14694,7 +14694,7 @@
         </p:nvSpPr>
         <p:spPr>
           <a:xfrm>
-            <a:off x="5005356" y="4243194"/>
+            <a:off x="5384903" y="4217730"/>
             <a:ext cx="2242297" cy="369332"/>
           </a:xfrm>
           <a:prstGeom prst="rect">
@@ -14736,7 +14736,7 @@
         </p:nvSpPr>
         <p:spPr>
           <a:xfrm>
-            <a:off x="5384903" y="4701904"/>
+            <a:off x="5550556" y="4664737"/>
             <a:ext cx="2573602" cy="369332"/>
           </a:xfrm>
           <a:prstGeom prst="rect">
@@ -14776,7 +14776,7 @@
         </p:nvSpPr>
         <p:spPr>
           <a:xfrm>
-            <a:off x="5384903" y="5145449"/>
+            <a:off x="5550556" y="5149107"/>
             <a:ext cx="2679619" cy="369332"/>
           </a:xfrm>
           <a:prstGeom prst="rect">
@@ -14961,12 +14961,12 @@
         </p:nvCxnSpPr>
         <p:spPr>
           <a:xfrm rot="10800000">
-            <a:off x="1682506" y="4303848"/>
-            <a:ext cx="3322850" cy="124012"/>
+            <a:off x="1623391" y="4309262"/>
+            <a:ext cx="3761512" cy="93134"/>
           </a:xfrm>
           <a:prstGeom prst="bentConnector3">
             <a:avLst>
-              <a:gd name="adj1" fmla="val 100051"/>
+              <a:gd name="adj1" fmla="val 100028"/>
             </a:avLst>
           </a:prstGeom>
           <a:ln w="19050">
@@ -15011,7 +15011,7 @@
         </p:nvCxnSpPr>
         <p:spPr>
           <a:xfrm flipH="1" flipV="1">
-            <a:off x="5005356" y="4708361"/>
+            <a:off x="5171009" y="4671194"/>
             <a:ext cx="379547" cy="178209"/>
           </a:xfrm>
           <a:prstGeom prst="straightConnector1">
@@ -15056,7 +15056,7 @@
         </p:nvCxnSpPr>
         <p:spPr>
           <a:xfrm flipH="1" flipV="1">
-            <a:off x="4812764" y="5077693"/>
+            <a:off x="4978417" y="5081351"/>
             <a:ext cx="572139" cy="252422"/>
           </a:xfrm>
           <a:prstGeom prst="straightConnector1">

</xml_diff>